<commit_message>
bulk update for Fall 2024
</commit_message>
<xml_diff>
--- a/Slides/T11 - NeuralNetsAI.pptx
+++ b/Slides/T11 - NeuralNetsAI.pptx
@@ -5,7 +5,7 @@
     <p:sldMasterId id="2147483676" r:id="rId1"/>
   </p:sldMasterIdLst>
   <p:notesMasterIdLst>
-    <p:notesMasterId r:id="rId19"/>
+    <p:notesMasterId r:id="rId20"/>
   </p:notesMasterIdLst>
   <p:sldIdLst>
     <p:sldId id="256" r:id="rId2"/>
@@ -23,8 +23,9 @@
     <p:sldId id="272" r:id="rId14"/>
     <p:sldId id="269" r:id="rId15"/>
     <p:sldId id="270" r:id="rId16"/>
-    <p:sldId id="271" r:id="rId17"/>
-    <p:sldId id="273" r:id="rId18"/>
+    <p:sldId id="274" r:id="rId17"/>
+    <p:sldId id="271" r:id="rId18"/>
+    <p:sldId id="273" r:id="rId19"/>
   </p:sldIdLst>
   <p:sldSz cx="9144000" cy="6858000" type="screen4x3"/>
   <p:notesSz cx="6858000" cy="9144000"/>
@@ -263,7 +264,7 @@
           <a:p>
             <a:fld id="{0813ED7A-E0CC-A14D-8702-3DBB30C4345D}" type="datetimeFigureOut">
               <a:rPr lang="en-US" smtClean="0"/>
-              <a:t>5/4/24</a:t>
+              <a:t>7/15/24</a:t>
             </a:fld>
             <a:endParaRPr lang="en-US"/>
           </a:p>
@@ -1159,7 +1160,7 @@
           <a:p>
             <a:fld id="{85312B09-6666-2149-A7EC-89A035875DEE}" type="slidenum">
               <a:rPr lang="en-US" smtClean="0"/>
-              <a:t>16</a:t>
+              <a:t>17</a:t>
             </a:fld>
             <a:endParaRPr lang="en-US"/>
           </a:p>
@@ -1332,7 +1333,7 @@
           <a:p>
             <a:fld id="{59F43C82-9B9B-AC4F-98CD-0ADC587116F3}" type="datetime1">
               <a:rPr lang="en-US" smtClean="0"/>
-              <a:t>5/4/24</a:t>
+              <a:t>7/15/24</a:t>
             </a:fld>
             <a:endParaRPr lang="en-US"/>
           </a:p>
@@ -1578,7 +1579,7 @@
           <a:p>
             <a:fld id="{F1178AE4-2A10-5F42-AC8C-4BD01A79A0D1}" type="datetime1">
               <a:rPr lang="en-US" smtClean="0"/>
-              <a:t>5/4/24</a:t>
+              <a:t>7/15/24</a:t>
             </a:fld>
             <a:endParaRPr lang="en-US"/>
           </a:p>
@@ -1774,7 +1775,7 @@
           <a:p>
             <a:fld id="{E675C519-8308-2748-8B0B-F7B055AE4297}" type="datetime1">
               <a:rPr lang="en-US" smtClean="0"/>
-              <a:t>5/4/24</a:t>
+              <a:t>7/15/24</a:t>
             </a:fld>
             <a:endParaRPr lang="en-US"/>
           </a:p>
@@ -2026,7 +2027,7 @@
           <a:p>
             <a:fld id="{ACD0997E-0CDD-7541-9D88-20A562751868}" type="datetime1">
               <a:rPr lang="en-US" smtClean="0"/>
-              <a:t>5/4/24</a:t>
+              <a:t>7/15/24</a:t>
             </a:fld>
             <a:endParaRPr lang="en-US"/>
           </a:p>
@@ -2278,7 +2279,7 @@
           <a:p>
             <a:fld id="{AC053AD8-5CA7-3F49-B495-B884AFEE8A16}" type="datetime1">
               <a:rPr lang="en-US" smtClean="0"/>
-              <a:t>5/4/24</a:t>
+              <a:t>7/15/24</a:t>
             </a:fld>
             <a:endParaRPr lang="en-US"/>
           </a:p>
@@ -2447,7 +2448,7 @@
           <a:p>
             <a:fld id="{6C751CFE-5FBC-BA47-8777-CE847435DFFA}" type="datetime1">
               <a:rPr lang="en-US" smtClean="0"/>
-              <a:t>5/4/24</a:t>
+              <a:t>7/15/24</a:t>
             </a:fld>
             <a:endParaRPr lang="en-US"/>
           </a:p>
@@ -2672,7 +2673,7 @@
           <a:p>
             <a:fld id="{7A75583E-7D50-3C4A-8A37-9B3FE7B04D6C}" type="datetime1">
               <a:rPr lang="en-US" smtClean="0"/>
-              <a:t>5/4/24</a:t>
+              <a:t>7/15/24</a:t>
             </a:fld>
             <a:endParaRPr lang="en-US"/>
           </a:p>
@@ -2981,7 +2982,7 @@
           <a:p>
             <a:fld id="{C3BC7800-B276-A64A-8AB0-19972C98F17B}" type="datetime1">
               <a:rPr lang="en-US" smtClean="0"/>
-              <a:t>5/4/24</a:t>
+              <a:t>7/15/24</a:t>
             </a:fld>
             <a:endParaRPr lang="en-US"/>
           </a:p>
@@ -3556,7 +3557,7 @@
           <a:p>
             <a:fld id="{8D5B1BC2-7DC9-274F-9AA5-41AD410B73E8}" type="datetime1">
               <a:rPr lang="en-US" smtClean="0"/>
-              <a:t>5/4/24</a:t>
+              <a:t>7/15/24</a:t>
             </a:fld>
             <a:endParaRPr lang="en-US"/>
           </a:p>
@@ -4023,7 +4024,7 @@
           <a:p>
             <a:fld id="{B7F9541A-B732-0842-A74F-0C72DB237063}" type="datetime1">
               <a:rPr lang="en-US" smtClean="0"/>
-              <a:t>5/4/24</a:t>
+              <a:t>7/15/24</a:t>
             </a:fld>
             <a:endParaRPr lang="en-US"/>
           </a:p>
@@ -4158,7 +4159,7 @@
           <a:p>
             <a:fld id="{F397BA72-28C9-9A46-8637-8A409BF0CACF}" type="datetime1">
               <a:rPr lang="en-US" smtClean="0"/>
-              <a:t>5/4/24</a:t>
+              <a:t>7/15/24</a:t>
             </a:fld>
             <a:endParaRPr lang="en-US"/>
           </a:p>
@@ -4301,7 +4302,7 @@
           <a:p>
             <a:fld id="{C54BA4BC-FC40-B844-8CA3-66DD08AD127A}" type="datetime1">
               <a:rPr lang="en-US" smtClean="0"/>
-              <a:t>5/4/24</a:t>
+              <a:t>7/15/24</a:t>
             </a:fld>
             <a:endParaRPr lang="en-US"/>
           </a:p>
@@ -4594,7 +4595,7 @@
           <a:p>
             <a:fld id="{A0381634-E977-7043-B341-F77FCA8D6817}" type="datetime1">
               <a:rPr lang="en-US" smtClean="0"/>
-              <a:t>5/4/24</a:t>
+              <a:t>7/15/24</a:t>
             </a:fld>
             <a:endParaRPr lang="en-US"/>
           </a:p>
@@ -4869,7 +4870,7 @@
           <a:p>
             <a:fld id="{C242C96D-D083-B04B-BE8C-D38697A2B148}" type="datetime1">
               <a:rPr lang="en-US" smtClean="0"/>
-              <a:t>5/4/24</a:t>
+              <a:t>7/15/24</a:t>
             </a:fld>
             <a:endParaRPr lang="en-US"/>
           </a:p>
@@ -5159,7 +5160,7 @@
           <a:p>
             <a:fld id="{C3BC7800-B276-A64A-8AB0-19972C98F17B}" type="datetime1">
               <a:rPr lang="en-US" smtClean="0"/>
-              <a:t>5/4/24</a:t>
+              <a:t>7/15/24</a:t>
             </a:fld>
             <a:endParaRPr lang="en-US"/>
           </a:p>
@@ -9159,6 +9160,233 @@
       </p:grpSpPr>
       <p:sp>
         <p:nvSpPr>
+          <p:cNvPr id="6" name="Title 5">
+            <a:extLst>
+              <a:ext uri="{FF2B5EF4-FFF2-40B4-BE49-F238E27FC236}">
+                <a16:creationId xmlns:a16="http://schemas.microsoft.com/office/drawing/2014/main" id="{DF6583C0-5588-E8C2-7485-1D48C7AA29FF}"/>
+              </a:ext>
+            </a:extLst>
+          </p:cNvPr>
+          <p:cNvSpPr>
+            <a:spLocks noGrp="1"/>
+          </p:cNvSpPr>
+          <p:nvPr>
+            <p:ph type="title"/>
+          </p:nvPr>
+        </p:nvSpPr>
+        <p:spPr/>
+        <p:txBody>
+          <a:bodyPr/>
+          <a:lstStyle/>
+          <a:p>
+            <a:r>
+              <a:rPr lang="en-US" dirty="0"/>
+              <a:t>Transformers =&gt; Gen AI</a:t>
+            </a:r>
+          </a:p>
+        </p:txBody>
+      </p:sp>
+      <p:sp>
+        <p:nvSpPr>
+          <p:cNvPr id="7" name="Content Placeholder 6">
+            <a:extLst>
+              <a:ext uri="{FF2B5EF4-FFF2-40B4-BE49-F238E27FC236}">
+                <a16:creationId xmlns:a16="http://schemas.microsoft.com/office/drawing/2014/main" id="{3AB4F06F-6283-0B56-3B0A-B8F4843BFF79}"/>
+              </a:ext>
+            </a:extLst>
+          </p:cNvPr>
+          <p:cNvSpPr>
+            <a:spLocks noGrp="1"/>
+          </p:cNvSpPr>
+          <p:nvPr>
+            <p:ph idx="1"/>
+          </p:nvPr>
+        </p:nvSpPr>
+        <p:spPr/>
+        <p:txBody>
+          <a:bodyPr/>
+          <a:lstStyle/>
+          <a:p>
+            <a:r>
+              <a:rPr lang="en-US" dirty="0"/>
+              <a:t>Andrej </a:t>
+            </a:r>
+            <a:r>
+              <a:rPr lang="en-US" dirty="0" err="1"/>
+              <a:t>Karpathy</a:t>
+            </a:r>
+            <a:r>
+              <a:rPr lang="en-US" dirty="0"/>
+              <a:t>: “Intro to Large Language Models”</a:t>
+            </a:r>
+          </a:p>
+        </p:txBody>
+      </p:sp>
+      <p:sp>
+        <p:nvSpPr>
+          <p:cNvPr id="2" name="Slide Number Placeholder 1">
+            <a:extLst>
+              <a:ext uri="{FF2B5EF4-FFF2-40B4-BE49-F238E27FC236}">
+                <a16:creationId xmlns:a16="http://schemas.microsoft.com/office/drawing/2014/main" id="{185CEF89-55EC-DD59-3BAB-5255C7DDEF45}"/>
+              </a:ext>
+            </a:extLst>
+          </p:cNvPr>
+          <p:cNvSpPr>
+            <a:spLocks noGrp="1"/>
+          </p:cNvSpPr>
+          <p:nvPr>
+            <p:ph type="sldNum" sz="quarter" idx="10"/>
+          </p:nvPr>
+        </p:nvSpPr>
+        <p:spPr/>
+        <p:txBody>
+          <a:bodyPr/>
+          <a:lstStyle/>
+          <a:p>
+            <a:fld id="{ABBEE3BA-F264-1746-880E-39AD601DF2B1}" type="slidenum">
+              <a:rPr lang="en-US" smtClean="0"/>
+              <a:t>16</a:t>
+            </a:fld>
+            <a:endParaRPr lang="en-US"/>
+          </a:p>
+        </p:txBody>
+      </p:sp>
+      <p:sp>
+        <p:nvSpPr>
+          <p:cNvPr id="3" name="TextBox 2">
+            <a:extLst>
+              <a:ext uri="{FF2B5EF4-FFF2-40B4-BE49-F238E27FC236}">
+                <a16:creationId xmlns:a16="http://schemas.microsoft.com/office/drawing/2014/main" id="{35455942-9BA1-3C81-C130-38B1217AC457}"/>
+              </a:ext>
+            </a:extLst>
+          </p:cNvPr>
+          <p:cNvSpPr txBox="1"/>
+          <p:nvPr/>
+        </p:nvSpPr>
+        <p:spPr>
+          <a:xfrm>
+            <a:off x="2261287" y="4814626"/>
+            <a:ext cx="4403000" cy="400110"/>
+          </a:xfrm>
+          <a:prstGeom prst="rect">
+            <a:avLst/>
+          </a:prstGeom>
+          <a:noFill/>
+        </p:spPr>
+        <p:txBody>
+          <a:bodyPr wrap="none" rtlCol="0">
+            <a:spAutoFit/>
+          </a:bodyPr>
+          <a:lstStyle/>
+          <a:p>
+            <a:pPr marL="0" indent="0" algn="l">
+              <a:buNone/>
+            </a:pPr>
+            <a:r>
+              <a:rPr lang="en-US" sz="2000" dirty="0">
+                <a:latin typeface="Tahoma" panose="020B0604030504040204" pitchFamily="34" charset="0"/>
+                <a:ea typeface="Tahoma" panose="020B0604030504040204" pitchFamily="34" charset="0"/>
+                <a:cs typeface="Tahoma" panose="020B0604030504040204" pitchFamily="34" charset="0"/>
+              </a:rPr>
+              <a:t>https://</a:t>
+            </a:r>
+            <a:r>
+              <a:rPr lang="en-US" sz="2000" dirty="0" err="1">
+                <a:latin typeface="Tahoma" panose="020B0604030504040204" pitchFamily="34" charset="0"/>
+                <a:ea typeface="Tahoma" panose="020B0604030504040204" pitchFamily="34" charset="0"/>
+                <a:cs typeface="Tahoma" panose="020B0604030504040204" pitchFamily="34" charset="0"/>
+              </a:rPr>
+              <a:t>youtu.be</a:t>
+            </a:r>
+            <a:r>
+              <a:rPr lang="en-US" sz="2000" dirty="0">
+                <a:latin typeface="Tahoma" panose="020B0604030504040204" pitchFamily="34" charset="0"/>
+                <a:ea typeface="Tahoma" panose="020B0604030504040204" pitchFamily="34" charset="0"/>
+                <a:cs typeface="Tahoma" panose="020B0604030504040204" pitchFamily="34" charset="0"/>
+              </a:rPr>
+              <a:t>/</a:t>
+            </a:r>
+            <a:r>
+              <a:rPr lang="en-US" sz="2000" dirty="0" err="1">
+                <a:latin typeface="Tahoma" panose="020B0604030504040204" pitchFamily="34" charset="0"/>
+                <a:ea typeface="Tahoma" panose="020B0604030504040204" pitchFamily="34" charset="0"/>
+                <a:cs typeface="Tahoma" panose="020B0604030504040204" pitchFamily="34" charset="0"/>
+              </a:rPr>
+              <a:t>zjkBMFhNj_g?t</a:t>
+            </a:r>
+            <a:r>
+              <a:rPr lang="en-US" sz="2000" dirty="0">
+                <a:latin typeface="Tahoma" panose="020B0604030504040204" pitchFamily="34" charset="0"/>
+                <a:ea typeface="Tahoma" panose="020B0604030504040204" pitchFamily="34" charset="0"/>
+                <a:cs typeface="Tahoma" panose="020B0604030504040204" pitchFamily="34" charset="0"/>
+              </a:rPr>
+              <a:t>=699</a:t>
+            </a:r>
+          </a:p>
+        </p:txBody>
+      </p:sp>
+      <p:pic>
+        <p:nvPicPr>
+          <p:cNvPr id="5" name="Picture 4" descr="A screenshot of a computer&#10;&#10;Description automatically generated">
+            <a:extLst>
+              <a:ext uri="{FF2B5EF4-FFF2-40B4-BE49-F238E27FC236}">
+                <a16:creationId xmlns:a16="http://schemas.microsoft.com/office/drawing/2014/main" id="{00473D05-F18B-EA7A-7218-005CF0C6174C}"/>
+              </a:ext>
+            </a:extLst>
+          </p:cNvPr>
+          <p:cNvPicPr>
+            <a:picLocks noChangeAspect="1"/>
+          </p:cNvPicPr>
+          <p:nvPr/>
+        </p:nvPicPr>
+        <p:blipFill>
+          <a:blip r:embed="rId2"/>
+          <a:stretch>
+            <a:fillRect/>
+          </a:stretch>
+        </p:blipFill>
+        <p:spPr>
+          <a:xfrm>
+            <a:off x="1130300" y="1533611"/>
+            <a:ext cx="6489700" cy="3149600"/>
+          </a:xfrm>
+          <a:prstGeom prst="rect">
+            <a:avLst/>
+          </a:prstGeom>
+        </p:spPr>
+      </p:pic>
+    </p:spTree>
+    <p:extLst>
+      <p:ext uri="{BB962C8B-B14F-4D97-AF65-F5344CB8AC3E}">
+        <p14:creationId xmlns:p14="http://schemas.microsoft.com/office/powerpoint/2010/main" val="1918916345"/>
+      </p:ext>
+    </p:extLst>
+  </p:cSld>
+  <p:clrMapOvr>
+    <a:masterClrMapping/>
+  </p:clrMapOvr>
+</p:sld>
+</file>
+
+<file path=ppt/slides/slide17.xml><?xml version="1.0" encoding="utf-8"?>
+<p:sld xmlns:a="http://schemas.openxmlformats.org/drawingml/2006/main" xmlns:r="http://schemas.openxmlformats.org/officeDocument/2006/relationships" xmlns:p="http://schemas.openxmlformats.org/presentationml/2006/main">
+  <p:cSld>
+    <p:spTree>
+      <p:nvGrpSpPr>
+        <p:cNvPr id="1" name=""/>
+        <p:cNvGrpSpPr/>
+        <p:nvPr/>
+      </p:nvGrpSpPr>
+      <p:grpSpPr>
+        <a:xfrm>
+          <a:off x="0" y="0"/>
+          <a:ext cx="0" cy="0"/>
+          <a:chOff x="0" y="0"/>
+          <a:chExt cx="0" cy="0"/>
+        </a:xfrm>
+      </p:grpSpPr>
+      <p:sp>
+        <p:nvSpPr>
           <p:cNvPr id="2" name="Title 1">
             <a:extLst>
               <a:ext uri="{FF2B5EF4-FFF2-40B4-BE49-F238E27FC236}">
@@ -9288,7 +9516,7 @@
           <a:p>
             <a:fld id="{ABBEE3BA-F264-1746-880E-39AD601DF2B1}" type="slidenum">
               <a:rPr lang="en-US" smtClean="0"/>
-              <a:t>16</a:t>
+              <a:t>17</a:t>
             </a:fld>
             <a:endParaRPr lang="en-US" dirty="0"/>
           </a:p>
@@ -9399,7 +9627,7 @@
 </p:sld>
 </file>
 
-<file path=ppt/slides/slide17.xml><?xml version="1.0" encoding="utf-8"?>
+<file path=ppt/slides/slide18.xml><?xml version="1.0" encoding="utf-8"?>
 <p:sld xmlns:a="http://schemas.openxmlformats.org/drawingml/2006/main" xmlns:r="http://schemas.openxmlformats.org/officeDocument/2006/relationships" xmlns:p="http://schemas.openxmlformats.org/presentationml/2006/main">
   <p:cSld>
     <p:spTree>
@@ -9439,7 +9667,7 @@
           <a:p>
             <a:fld id="{ABBEE3BA-F264-1746-880E-39AD601DF2B1}" type="slidenum">
               <a:rPr lang="en-US" smtClean="0"/>
-              <a:t>17</a:t>
+              <a:t>18</a:t>
             </a:fld>
             <a:endParaRPr lang="en-US"/>
           </a:p>

</xml_diff>

<commit_message>
final sync Fall 24
</commit_message>
<xml_diff>
--- a/Slides/T11 - NeuralNetsAI.pptx
+++ b/Slides/T11 - NeuralNetsAI.pptx
@@ -264,7 +264,7 @@
           <a:p>
             <a:fld id="{0813ED7A-E0CC-A14D-8702-3DBB30C4345D}" type="datetimeFigureOut">
               <a:rPr lang="en-US" smtClean="0"/>
-              <a:t>7/15/24</a:t>
+              <a:t>12/2/24</a:t>
             </a:fld>
             <a:endParaRPr lang="en-US"/>
           </a:p>
@@ -1139,6 +1139,93 @@
           <a:bodyPr/>
           <a:lstStyle/>
           <a:p>
+            <a:r>
+              <a:rPr lang="en-US" dirty="0"/>
+              <a:t>13:00-14:00 range</a:t>
+            </a:r>
+          </a:p>
+        </p:txBody>
+      </p:sp>
+      <p:sp>
+        <p:nvSpPr>
+          <p:cNvPr id="4" name="Slide Number Placeholder 3"/>
+          <p:cNvSpPr>
+            <a:spLocks noGrp="1"/>
+          </p:cNvSpPr>
+          <p:nvPr>
+            <p:ph type="sldNum" sz="quarter" idx="5"/>
+          </p:nvPr>
+        </p:nvSpPr>
+        <p:spPr/>
+        <p:txBody>
+          <a:bodyPr/>
+          <a:lstStyle/>
+          <a:p>
+            <a:fld id="{85312B09-6666-2149-A7EC-89A035875DEE}" type="slidenum">
+              <a:rPr lang="en-US" smtClean="0"/>
+              <a:t>16</a:t>
+            </a:fld>
+            <a:endParaRPr lang="en-US"/>
+          </a:p>
+        </p:txBody>
+      </p:sp>
+    </p:spTree>
+    <p:extLst>
+      <p:ext uri="{BB962C8B-B14F-4D97-AF65-F5344CB8AC3E}">
+        <p14:creationId xmlns:p14="http://schemas.microsoft.com/office/powerpoint/2010/main" val="1771340017"/>
+      </p:ext>
+    </p:extLst>
+  </p:cSld>
+  <p:clrMapOvr>
+    <a:masterClrMapping/>
+  </p:clrMapOvr>
+</p:notes>
+</file>
+
+<file path=ppt/notesSlides/notesSlide8.xml><?xml version="1.0" encoding="utf-8"?>
+<p:notes xmlns:a="http://schemas.openxmlformats.org/drawingml/2006/main" xmlns:r="http://schemas.openxmlformats.org/officeDocument/2006/relationships" xmlns:p="http://schemas.openxmlformats.org/presentationml/2006/main">
+  <p:cSld>
+    <p:spTree>
+      <p:nvGrpSpPr>
+        <p:cNvPr id="1" name=""/>
+        <p:cNvGrpSpPr/>
+        <p:nvPr/>
+      </p:nvGrpSpPr>
+      <p:grpSpPr>
+        <a:xfrm>
+          <a:off x="0" y="0"/>
+          <a:ext cx="0" cy="0"/>
+          <a:chOff x="0" y="0"/>
+          <a:chExt cx="0" cy="0"/>
+        </a:xfrm>
+      </p:grpSpPr>
+      <p:sp>
+        <p:nvSpPr>
+          <p:cNvPr id="2" name="Slide Image Placeholder 1"/>
+          <p:cNvSpPr>
+            <a:spLocks noGrp="1" noRot="1" noChangeAspect="1"/>
+          </p:cNvSpPr>
+          <p:nvPr>
+            <p:ph type="sldImg"/>
+          </p:nvPr>
+        </p:nvSpPr>
+        <p:spPr/>
+      </p:sp>
+      <p:sp>
+        <p:nvSpPr>
+          <p:cNvPr id="3" name="Notes Placeholder 2"/>
+          <p:cNvSpPr>
+            <a:spLocks noGrp="1"/>
+          </p:cNvSpPr>
+          <p:nvPr>
+            <p:ph type="body" idx="1"/>
+          </p:nvPr>
+        </p:nvSpPr>
+        <p:spPr/>
+        <p:txBody>
+          <a:bodyPr/>
+          <a:lstStyle/>
+          <a:p>
             <a:endParaRPr lang="en-US" dirty="0"/>
           </a:p>
         </p:txBody>
@@ -1333,7 +1420,7 @@
           <a:p>
             <a:fld id="{59F43C82-9B9B-AC4F-98CD-0ADC587116F3}" type="datetime1">
               <a:rPr lang="en-US" smtClean="0"/>
-              <a:t>7/15/24</a:t>
+              <a:t>12/2/24</a:t>
             </a:fld>
             <a:endParaRPr lang="en-US"/>
           </a:p>
@@ -1579,7 +1666,7 @@
           <a:p>
             <a:fld id="{F1178AE4-2A10-5F42-AC8C-4BD01A79A0D1}" type="datetime1">
               <a:rPr lang="en-US" smtClean="0"/>
-              <a:t>7/15/24</a:t>
+              <a:t>12/2/24</a:t>
             </a:fld>
             <a:endParaRPr lang="en-US"/>
           </a:p>
@@ -1775,7 +1862,7 @@
           <a:p>
             <a:fld id="{E675C519-8308-2748-8B0B-F7B055AE4297}" type="datetime1">
               <a:rPr lang="en-US" smtClean="0"/>
-              <a:t>7/15/24</a:t>
+              <a:t>12/2/24</a:t>
             </a:fld>
             <a:endParaRPr lang="en-US"/>
           </a:p>
@@ -2027,7 +2114,7 @@
           <a:p>
             <a:fld id="{ACD0997E-0CDD-7541-9D88-20A562751868}" type="datetime1">
               <a:rPr lang="en-US" smtClean="0"/>
-              <a:t>7/15/24</a:t>
+              <a:t>12/2/24</a:t>
             </a:fld>
             <a:endParaRPr lang="en-US"/>
           </a:p>
@@ -2279,7 +2366,7 @@
           <a:p>
             <a:fld id="{AC053AD8-5CA7-3F49-B495-B884AFEE8A16}" type="datetime1">
               <a:rPr lang="en-US" smtClean="0"/>
-              <a:t>7/15/24</a:t>
+              <a:t>12/2/24</a:t>
             </a:fld>
             <a:endParaRPr lang="en-US"/>
           </a:p>
@@ -2448,7 +2535,7 @@
           <a:p>
             <a:fld id="{6C751CFE-5FBC-BA47-8777-CE847435DFFA}" type="datetime1">
               <a:rPr lang="en-US" smtClean="0"/>
-              <a:t>7/15/24</a:t>
+              <a:t>12/2/24</a:t>
             </a:fld>
             <a:endParaRPr lang="en-US"/>
           </a:p>
@@ -2673,7 +2760,7 @@
           <a:p>
             <a:fld id="{7A75583E-7D50-3C4A-8A37-9B3FE7B04D6C}" type="datetime1">
               <a:rPr lang="en-US" smtClean="0"/>
-              <a:t>7/15/24</a:t>
+              <a:t>12/2/24</a:t>
             </a:fld>
             <a:endParaRPr lang="en-US"/>
           </a:p>
@@ -2982,7 +3069,7 @@
           <a:p>
             <a:fld id="{C3BC7800-B276-A64A-8AB0-19972C98F17B}" type="datetime1">
               <a:rPr lang="en-US" smtClean="0"/>
-              <a:t>7/15/24</a:t>
+              <a:t>12/2/24</a:t>
             </a:fld>
             <a:endParaRPr lang="en-US"/>
           </a:p>
@@ -3557,7 +3644,7 @@
           <a:p>
             <a:fld id="{8D5B1BC2-7DC9-274F-9AA5-41AD410B73E8}" type="datetime1">
               <a:rPr lang="en-US" smtClean="0"/>
-              <a:t>7/15/24</a:t>
+              <a:t>12/2/24</a:t>
             </a:fld>
             <a:endParaRPr lang="en-US"/>
           </a:p>
@@ -4024,7 +4111,7 @@
           <a:p>
             <a:fld id="{B7F9541A-B732-0842-A74F-0C72DB237063}" type="datetime1">
               <a:rPr lang="en-US" smtClean="0"/>
-              <a:t>7/15/24</a:t>
+              <a:t>12/2/24</a:t>
             </a:fld>
             <a:endParaRPr lang="en-US"/>
           </a:p>
@@ -4159,7 +4246,7 @@
           <a:p>
             <a:fld id="{F397BA72-28C9-9A46-8637-8A409BF0CACF}" type="datetime1">
               <a:rPr lang="en-US" smtClean="0"/>
-              <a:t>7/15/24</a:t>
+              <a:t>12/2/24</a:t>
             </a:fld>
             <a:endParaRPr lang="en-US"/>
           </a:p>
@@ -4302,7 +4389,7 @@
           <a:p>
             <a:fld id="{C54BA4BC-FC40-B844-8CA3-66DD08AD127A}" type="datetime1">
               <a:rPr lang="en-US" smtClean="0"/>
-              <a:t>7/15/24</a:t>
+              <a:t>12/2/24</a:t>
             </a:fld>
             <a:endParaRPr lang="en-US"/>
           </a:p>
@@ -4595,7 +4682,7 @@
           <a:p>
             <a:fld id="{A0381634-E977-7043-B341-F77FCA8D6817}" type="datetime1">
               <a:rPr lang="en-US" smtClean="0"/>
-              <a:t>7/15/24</a:t>
+              <a:t>12/2/24</a:t>
             </a:fld>
             <a:endParaRPr lang="en-US"/>
           </a:p>
@@ -4870,7 +4957,7 @@
           <a:p>
             <a:fld id="{C242C96D-D083-B04B-BE8C-D38697A2B148}" type="datetime1">
               <a:rPr lang="en-US" smtClean="0"/>
-              <a:t>7/15/24</a:t>
+              <a:t>12/2/24</a:t>
             </a:fld>
             <a:endParaRPr lang="en-US"/>
           </a:p>
@@ -5160,7 +5247,7 @@
           <a:p>
             <a:fld id="{C3BC7800-B276-A64A-8AB0-19972C98F17B}" type="datetime1">
               <a:rPr lang="en-US" smtClean="0"/>
-              <a:t>7/15/24</a:t>
+              <a:t>12/2/24</a:t>
             </a:fld>
             <a:endParaRPr lang="en-US"/>
           </a:p>
@@ -5772,7 +5859,7 @@
           <a:p>
             <a:r>
               <a:rPr lang="en-US" dirty="0"/>
-              <a:t>NYU Stern:  Spring 2024</a:t>
+              <a:t>NYU Stern:  Fall 2024</a:t>
             </a:r>
           </a:p>
         </p:txBody>
@@ -9265,7 +9352,7 @@
         </p:nvSpPr>
         <p:spPr>
           <a:xfrm>
-            <a:off x="2261287" y="4814626"/>
+            <a:off x="642552" y="5059601"/>
             <a:ext cx="4403000" cy="400110"/>
           </a:xfrm>
           <a:prstGeom prst="rect">
@@ -9340,7 +9427,7 @@
           <p:nvPr/>
         </p:nvPicPr>
         <p:blipFill>
-          <a:blip r:embed="rId2"/>
+          <a:blip r:embed="rId3"/>
           <a:stretch>
             <a:fillRect/>
           </a:stretch>
@@ -9355,6 +9442,221 @@
           </a:prstGeom>
         </p:spPr>
       </p:pic>
+      <p:sp>
+        <p:nvSpPr>
+          <p:cNvPr id="8" name="Rounded Rectangular Callout 7">
+            <a:extLst>
+              <a:ext uri="{FF2B5EF4-FFF2-40B4-BE49-F238E27FC236}">
+                <a16:creationId xmlns:a16="http://schemas.microsoft.com/office/drawing/2014/main" id="{E70E6DD6-9917-972C-B0CC-D9B3D05BB71E}"/>
+              </a:ext>
+            </a:extLst>
+          </p:cNvPr>
+          <p:cNvSpPr/>
+          <p:nvPr/>
+        </p:nvSpPr>
+        <p:spPr bwMode="auto">
+          <a:xfrm>
+            <a:off x="5609968" y="2711793"/>
+            <a:ext cx="3534032" cy="476250"/>
+          </a:xfrm>
+          <a:prstGeom prst="wedgeRoundRectCallout">
+            <a:avLst>
+              <a:gd name="adj1" fmla="val -1825"/>
+              <a:gd name="adj2" fmla="val 146809"/>
+              <a:gd name="adj3" fmla="val 16667"/>
+            </a:avLst>
+          </a:prstGeom>
+          <a:solidFill>
+            <a:schemeClr val="accent1"/>
+          </a:solidFill>
+          <a:ln w="9525" cap="flat" cmpd="sng" algn="ctr">
+            <a:noFill/>
+            <a:prstDash val="solid"/>
+            <a:round/>
+            <a:headEnd type="none" w="med" len="med"/>
+            <a:tailEnd type="none" w="med" len="med"/>
+          </a:ln>
+          <a:effectLst/>
+        </p:spPr>
+        <p:txBody>
+          <a:bodyPr vert="horz" wrap="square" lIns="91440" tIns="45720" rIns="91440" bIns="45720" numCol="1" rtlCol="0" anchor="t" anchorCtr="0" compatLnSpc="1">
+            <a:prstTxWarp prst="textNoShape">
+              <a:avLst/>
+            </a:prstTxWarp>
+          </a:bodyPr>
+          <a:lstStyle/>
+          <a:p>
+            <a:pPr marR="0" algn="ctr" defTabSz="914400" rtl="0" eaLnBrk="1" fontAlgn="base" latinLnBrk="0" hangingPunct="1">
+              <a:lnSpc>
+                <a:spcPct val="100000"/>
+              </a:lnSpc>
+              <a:spcBef>
+                <a:spcPct val="20000"/>
+              </a:spcBef>
+              <a:spcAft>
+                <a:spcPct val="0"/>
+              </a:spcAft>
+              <a:buClr>
+                <a:srgbClr val="8E0D30"/>
+              </a:buClr>
+              <a:buSzTx/>
+              <a:buNone/>
+              <a:tabLst/>
+            </a:pPr>
+            <a:r>
+              <a:rPr kumimoji="0" lang="en-US" sz="1800" b="0" i="0" u="none" strike="noStrike" cap="none" normalizeH="0" baseline="0" dirty="0">
+                <a:ln>
+                  <a:noFill/>
+                </a:ln>
+                <a:solidFill>
+                  <a:schemeClr val="tx1"/>
+                </a:solidFill>
+                <a:effectLst/>
+                <a:latin typeface="Tahoma" panose="020B0604030504040204" pitchFamily="34" charset="0"/>
+                <a:ea typeface="Tahoma" panose="020B0604030504040204" pitchFamily="34" charset="0"/>
+                <a:cs typeface="Tahoma" panose="020B0604030504040204" pitchFamily="34" charset="0"/>
+              </a:rPr>
+              <a:t>We don’t know how these work</a:t>
+            </a:r>
+          </a:p>
+        </p:txBody>
+      </p:sp>
+      <p:sp>
+        <p:nvSpPr>
+          <p:cNvPr id="10" name="Rounded Rectangle 9">
+            <a:extLst>
+              <a:ext uri="{FF2B5EF4-FFF2-40B4-BE49-F238E27FC236}">
+                <a16:creationId xmlns:a16="http://schemas.microsoft.com/office/drawing/2014/main" id="{670B02B9-FA74-799A-11A0-6105D52DDC8B}"/>
+              </a:ext>
+            </a:extLst>
+          </p:cNvPr>
+          <p:cNvSpPr/>
+          <p:nvPr/>
+        </p:nvSpPr>
+        <p:spPr bwMode="auto">
+          <a:xfrm>
+            <a:off x="5739714" y="4784720"/>
+            <a:ext cx="2613453" cy="726708"/>
+          </a:xfrm>
+          <a:prstGeom prst="roundRect">
+            <a:avLst/>
+          </a:prstGeom>
+          <a:solidFill>
+            <a:srgbClr val="FFC000"/>
+          </a:solidFill>
+          <a:ln w="9525" cap="flat" cmpd="sng" algn="ctr">
+            <a:noFill/>
+            <a:prstDash val="solid"/>
+            <a:round/>
+            <a:headEnd type="none" w="med" len="med"/>
+            <a:tailEnd type="none" w="med" len="med"/>
+          </a:ln>
+          <a:effectLst/>
+        </p:spPr>
+        <p:txBody>
+          <a:bodyPr vert="horz" wrap="square" lIns="91440" tIns="45720" rIns="91440" bIns="45720" numCol="1" rtlCol="0" anchor="t" anchorCtr="0" compatLnSpc="1">
+            <a:prstTxWarp prst="textNoShape">
+              <a:avLst/>
+            </a:prstTxWarp>
+          </a:bodyPr>
+          <a:lstStyle/>
+          <a:p>
+            <a:pPr marR="0" algn="ctr" defTabSz="914400" rtl="0" eaLnBrk="1" fontAlgn="base" latinLnBrk="0" hangingPunct="1">
+              <a:lnSpc>
+                <a:spcPct val="100000"/>
+              </a:lnSpc>
+              <a:spcBef>
+                <a:spcPct val="20000"/>
+              </a:spcBef>
+              <a:spcAft>
+                <a:spcPct val="0"/>
+              </a:spcAft>
+              <a:buClr>
+                <a:srgbClr val="8E0D30"/>
+              </a:buClr>
+              <a:buSzTx/>
+              <a:buNone/>
+              <a:tabLst/>
+            </a:pPr>
+            <a:r>
+              <a:rPr kumimoji="0" lang="en-US" sz="1600" b="0" i="0" u="none" strike="noStrike" cap="none" normalizeH="0" baseline="0" dirty="0">
+                <a:ln>
+                  <a:noFill/>
+                </a:ln>
+                <a:solidFill>
+                  <a:schemeClr val="tx1"/>
+                </a:solidFill>
+                <a:effectLst/>
+                <a:latin typeface="Tahoma" panose="020B0604030504040204" pitchFamily="34" charset="0"/>
+                <a:ea typeface="Tahoma" panose="020B0604030504040204" pitchFamily="34" charset="0"/>
+                <a:cs typeface="Tahoma" panose="020B0604030504040204" pitchFamily="34" charset="0"/>
+              </a:rPr>
+              <a:t>Andrej </a:t>
+            </a:r>
+            <a:r>
+              <a:rPr kumimoji="0" lang="en-US" sz="1600" b="0" i="0" u="none" strike="noStrike" cap="none" normalizeH="0" baseline="0" dirty="0" err="1">
+                <a:ln>
+                  <a:noFill/>
+                </a:ln>
+                <a:solidFill>
+                  <a:schemeClr val="tx1"/>
+                </a:solidFill>
+                <a:effectLst/>
+                <a:latin typeface="Tahoma" panose="020B0604030504040204" pitchFamily="34" charset="0"/>
+                <a:ea typeface="Tahoma" panose="020B0604030504040204" pitchFamily="34" charset="0"/>
+                <a:cs typeface="Tahoma" panose="020B0604030504040204" pitchFamily="34" charset="0"/>
+              </a:rPr>
+              <a:t>Karpathy</a:t>
+            </a:r>
+            <a:endParaRPr kumimoji="0" lang="en-US" sz="1600" b="0" i="0" u="none" strike="noStrike" cap="none" normalizeH="0" baseline="0" dirty="0">
+              <a:ln>
+                <a:noFill/>
+              </a:ln>
+              <a:solidFill>
+                <a:schemeClr val="tx1"/>
+              </a:solidFill>
+              <a:effectLst/>
+              <a:latin typeface="Tahoma" panose="020B0604030504040204" pitchFamily="34" charset="0"/>
+              <a:ea typeface="Tahoma" panose="020B0604030504040204" pitchFamily="34" charset="0"/>
+              <a:cs typeface="Tahoma" panose="020B0604030504040204" pitchFamily="34" charset="0"/>
+            </a:endParaRPr>
+          </a:p>
+          <a:p>
+            <a:pPr marR="0" algn="ctr" defTabSz="914400" rtl="0" eaLnBrk="1" fontAlgn="base" latinLnBrk="0" hangingPunct="1">
+              <a:lnSpc>
+                <a:spcPct val="100000"/>
+              </a:lnSpc>
+              <a:spcBef>
+                <a:spcPct val="20000"/>
+              </a:spcBef>
+              <a:spcAft>
+                <a:spcPct val="0"/>
+              </a:spcAft>
+              <a:buClr>
+                <a:srgbClr val="8E0D30"/>
+              </a:buClr>
+              <a:buSzTx/>
+              <a:buNone/>
+              <a:tabLst/>
+            </a:pPr>
+            <a:r>
+              <a:rPr kumimoji="0" lang="en-US" sz="1600" b="0" i="0" u="none" strike="noStrike" cap="none" normalizeH="0" baseline="0" dirty="0">
+                <a:ln>
+                  <a:noFill/>
+                </a:ln>
+                <a:solidFill>
+                  <a:schemeClr val="tx1"/>
+                </a:solidFill>
+                <a:effectLst/>
+                <a:latin typeface="Tahoma" panose="020B0604030504040204" pitchFamily="34" charset="0"/>
+                <a:ea typeface="Tahoma" panose="020B0604030504040204" pitchFamily="34" charset="0"/>
+                <a:cs typeface="Tahoma" panose="020B0604030504040204" pitchFamily="34" charset="0"/>
+              </a:rPr>
+              <a:t>Cofounder of OpenAI</a:t>
+            </a:r>
+          </a:p>
+        </p:txBody>
+      </p:sp>
     </p:spTree>
     <p:extLst>
       <p:ext uri="{BB962C8B-B14F-4D97-AF65-F5344CB8AC3E}">
@@ -9365,6 +9667,84 @@
   <p:clrMapOvr>
     <a:masterClrMapping/>
   </p:clrMapOvr>
+  <p:timing>
+    <p:tnLst>
+      <p:par>
+        <p:cTn id="1" dur="indefinite" restart="never" nodeType="tmRoot">
+          <p:childTnLst>
+            <p:seq concurrent="1" nextAc="seek">
+              <p:cTn id="2" dur="indefinite" nodeType="mainSeq">
+                <p:childTnLst>
+                  <p:par>
+                    <p:cTn id="3" fill="hold">
+                      <p:stCondLst>
+                        <p:cond delay="indefinite"/>
+                      </p:stCondLst>
+                      <p:childTnLst>
+                        <p:par>
+                          <p:cTn id="4" fill="hold">
+                            <p:stCondLst>
+                              <p:cond delay="0"/>
+                            </p:stCondLst>
+                            <p:childTnLst>
+                              <p:par>
+                                <p:cTn id="5" presetID="1" presetClass="entr" presetSubtype="0" fill="hold" grpId="0" nodeType="clickEffect">
+                                  <p:stCondLst>
+                                    <p:cond delay="0"/>
+                                  </p:stCondLst>
+                                  <p:childTnLst>
+                                    <p:set>
+                                      <p:cBhvr>
+                                        <p:cTn id="6" dur="1" fill="hold">
+                                          <p:stCondLst>
+                                            <p:cond delay="0"/>
+                                          </p:stCondLst>
+                                        </p:cTn>
+                                        <p:tgtEl>
+                                          <p:spTgt spid="8"/>
+                                        </p:tgtEl>
+                                        <p:attrNameLst>
+                                          <p:attrName>style.visibility</p:attrName>
+                                        </p:attrNameLst>
+                                      </p:cBhvr>
+                                      <p:to>
+                                        <p:strVal val="visible"/>
+                                      </p:to>
+                                    </p:set>
+                                  </p:childTnLst>
+                                </p:cTn>
+                              </p:par>
+                            </p:childTnLst>
+                          </p:cTn>
+                        </p:par>
+                      </p:childTnLst>
+                    </p:cTn>
+                  </p:par>
+                </p:childTnLst>
+              </p:cTn>
+              <p:prevCondLst>
+                <p:cond evt="onPrev" delay="0">
+                  <p:tgtEl>
+                    <p:sldTgt/>
+                  </p:tgtEl>
+                </p:cond>
+              </p:prevCondLst>
+              <p:nextCondLst>
+                <p:cond evt="onNext" delay="0">
+                  <p:tgtEl>
+                    <p:sldTgt/>
+                  </p:tgtEl>
+                </p:cond>
+              </p:nextCondLst>
+            </p:seq>
+          </p:childTnLst>
+        </p:cTn>
+      </p:par>
+    </p:tnLst>
+    <p:bldLst>
+      <p:bldP spid="8" grpId="0" animBg="1"/>
+    </p:bldLst>
+  </p:timing>
 </p:sld>
 </file>
 
@@ -9614,6 +9994,53 @@
           </a:p>
         </p:txBody>
       </p:sp>
+      <p:pic>
+        <p:nvPicPr>
+          <p:cNvPr id="6" name="Picture 2" descr="a cartoon of spongebob saying magic with his hands up">
+            <a:extLst>
+              <a:ext uri="{FF2B5EF4-FFF2-40B4-BE49-F238E27FC236}">
+                <a16:creationId xmlns:a16="http://schemas.microsoft.com/office/drawing/2014/main" id="{66D82B80-9B09-9150-1029-22E824434DDA}"/>
+              </a:ext>
+            </a:extLst>
+          </p:cNvPr>
+          <p:cNvPicPr>
+            <a:picLocks noChangeAspect="1" noChangeArrowheads="1"/>
+          </p:cNvPicPr>
+          <p:nvPr/>
+        </p:nvPicPr>
+        <p:blipFill>
+          <a:blip r:embed="rId4">
+            <a:extLst>
+              <a:ext uri="{28A0092B-C50C-407E-A947-70E740481C1C}">
+                <a14:useLocalDpi xmlns:a14="http://schemas.microsoft.com/office/drawing/2010/main" val="0"/>
+              </a:ext>
+            </a:extLst>
+          </a:blip>
+          <a:srcRect/>
+          <a:stretch>
+            <a:fillRect/>
+          </a:stretch>
+        </p:blipFill>
+        <p:spPr bwMode="auto">
+          <a:xfrm>
+            <a:off x="2802282" y="5399902"/>
+            <a:ext cx="1872587" cy="1378905"/>
+          </a:xfrm>
+          <a:prstGeom prst="rect">
+            <a:avLst/>
+          </a:prstGeom>
+          <a:noFill/>
+          <a:extLst>
+            <a:ext uri="{909E8E84-426E-40DD-AFC4-6F175D3DCCD1}">
+              <a14:hiddenFill xmlns:a14="http://schemas.microsoft.com/office/drawing/2010/main">
+                <a:solidFill>
+                  <a:srgbClr val="FFFFFF"/>
+                </a:solidFill>
+              </a14:hiddenFill>
+            </a:ext>
+          </a:extLst>
+        </p:spPr>
+      </p:pic>
     </p:spTree>
     <p:extLst>
       <p:ext uri="{BB962C8B-B14F-4D97-AF65-F5344CB8AC3E}">

</xml_diff>